<commit_message>
update na apresentacao (falta 1 imagem)
</commit_message>
<xml_diff>
--- a/Apresentação projeto.pptx
+++ b/Apresentação projeto.pptx
@@ -11,6 +11,7 @@
     <p:sldId id="259" r:id="rId5"/>
     <p:sldId id="260" r:id="rId6"/>
     <p:sldId id="261" r:id="rId7"/>
+    <p:sldId id="262" r:id="rId8"/>
   </p:sldIdLst>
   <p:sldSz cx="12192000" cy="6858000"/>
   <p:notesSz cx="6858000" cy="9144000"/>
@@ -109,6 +110,11 @@
       </a:defRPr>
     </a:lvl9pPr>
   </p:defaultTextStyle>
+  <p:extLst>
+    <p:ext uri="{EFAFB233-063F-42B5-8137-9DF3F51BA10A}">
+      <p15:sldGuideLst xmlns:p15="http://schemas.microsoft.com/office/powerpoint/2012/main"/>
+    </p:ext>
+  </p:extLst>
 </p:presentation>
 </file>
 
@@ -4279,14 +4285,13 @@
         </p:nvPicPr>
         <p:blipFill>
           <a:blip r:embed="rId2"/>
-          <a:stretch>
-            <a:fillRect/>
-          </a:stretch>
+          <a:srcRect/>
+          <a:stretch/>
         </p:blipFill>
         <p:spPr>
           <a:xfrm>
             <a:off x="8109604" y="970949"/>
-            <a:ext cx="2069744" cy="4599432"/>
+            <a:ext cx="2069744" cy="4599431"/>
           </a:xfrm>
           <a:prstGeom prst="rect">
             <a:avLst/>
@@ -4983,14 +4988,13 @@
         </p:nvPicPr>
         <p:blipFill>
           <a:blip r:embed="rId3"/>
-          <a:stretch>
-            <a:fillRect/>
-          </a:stretch>
+          <a:srcRect/>
+          <a:stretch/>
         </p:blipFill>
         <p:spPr>
           <a:xfrm>
-            <a:off x="10132343" y="2713759"/>
-            <a:ext cx="1361055" cy="3024567"/>
+            <a:off x="10132343" y="2788625"/>
+            <a:ext cx="1361055" cy="2874835"/>
           </a:xfrm>
           <a:prstGeom prst="rect">
             <a:avLst/>
@@ -5551,14 +5555,13 @@
         </p:nvPicPr>
         <p:blipFill>
           <a:blip r:embed="rId2"/>
-          <a:stretch>
-            <a:fillRect/>
-          </a:stretch>
+          <a:srcRect/>
+          <a:stretch/>
         </p:blipFill>
         <p:spPr>
           <a:xfrm>
             <a:off x="8109604" y="970949"/>
-            <a:ext cx="2069744" cy="4599432"/>
+            <a:ext cx="2069744" cy="4599431"/>
           </a:xfrm>
           <a:prstGeom prst="rect">
             <a:avLst/>
@@ -6197,9 +6200,640 @@
         </p:nvPicPr>
         <p:blipFill>
           <a:blip r:embed="rId2"/>
-          <a:stretch>
-            <a:fillRect/>
-          </a:stretch>
+          <a:srcRect/>
+          <a:stretch/>
+        </p:blipFill>
+        <p:spPr>
+          <a:xfrm>
+            <a:off x="8109604" y="970949"/>
+            <a:ext cx="2069744" cy="4599431"/>
+          </a:xfrm>
+          <a:prstGeom prst="rect">
+            <a:avLst/>
+          </a:prstGeom>
+        </p:spPr>
+      </p:pic>
+    </p:spTree>
+    <p:extLst>
+      <p:ext uri="{BB962C8B-B14F-4D97-AF65-F5344CB8AC3E}">
+        <p14:creationId xmlns:p14="http://schemas.microsoft.com/office/powerpoint/2010/main" val="2459171491"/>
+      </p:ext>
+    </p:extLst>
+  </p:cSld>
+  <p:clrMapOvr>
+    <a:masterClrMapping/>
+  </p:clrMapOvr>
+</p:sld>
+</file>
+
+<file path=ppt/slides/slide7.xml><?xml version="1.0" encoding="utf-8"?>
+<p:sld xmlns:a="http://schemas.openxmlformats.org/drawingml/2006/main" xmlns:r="http://schemas.openxmlformats.org/officeDocument/2006/relationships" xmlns:p="http://schemas.openxmlformats.org/presentationml/2006/main">
+  <p:cSld>
+    <p:bg>
+      <p:bgPr>
+        <a:solidFill>
+          <a:schemeClr val="bg2"/>
+        </a:solidFill>
+        <a:effectLst/>
+      </p:bgPr>
+    </p:bg>
+    <p:spTree>
+      <p:nvGrpSpPr>
+        <p:cNvPr id="1" name=""/>
+        <p:cNvGrpSpPr/>
+        <p:nvPr/>
+      </p:nvGrpSpPr>
+      <p:grpSpPr>
+        <a:xfrm>
+          <a:off x="0" y="0"/>
+          <a:ext cx="0" cy="0"/>
+          <a:chOff x="0" y="0"/>
+          <a:chExt cx="0" cy="0"/>
+        </a:xfrm>
+      </p:grpSpPr>
+      <p:sp>
+        <p:nvSpPr>
+          <p:cNvPr id="37" name="Rectangle 36">
+            <a:extLst>
+              <a:ext uri="{FF2B5EF4-FFF2-40B4-BE49-F238E27FC236}">
+                <a16:creationId xmlns:a16="http://schemas.microsoft.com/office/drawing/2014/main" id="{7A816DFB-8B0F-47B3-BC12-7B9F59B4EC58}"/>
+              </a:ext>
+              <a:ext uri="{C183D7F6-B498-43B3-948B-1728B52AA6E4}">
+                <adec:decorative xmlns:adec="http://schemas.microsoft.com/office/drawing/2017/decorative" val="1"/>
+              </a:ext>
+            </a:extLst>
+          </p:cNvPr>
+          <p:cNvSpPr>
+            <a:spLocks noGrp="1" noRot="1" noChangeAspect="1" noMove="1" noResize="1" noEditPoints="1" noAdjustHandles="1" noChangeArrowheads="1" noChangeShapeType="1" noTextEdit="1"/>
+          </p:cNvSpPr>
+          <p:nvPr>
+            <p:extLst>
+              <p:ext uri="{386F3935-93C4-4BCD-93E2-E3B085C9AB24}">
+                <p16:designElem xmlns:p16="http://schemas.microsoft.com/office/powerpoint/2015/main" val="1"/>
+              </p:ext>
+            </p:extLst>
+          </p:nvPr>
+        </p:nvSpPr>
+        <p:spPr>
+          <a:xfrm>
+            <a:off x="0" y="-2"/>
+            <a:ext cx="6072915" cy="6858002"/>
+          </a:xfrm>
+          <a:prstGeom prst="rect">
+            <a:avLst/>
+          </a:prstGeom>
+          <a:solidFill>
+            <a:schemeClr val="accent2"/>
+          </a:solidFill>
+          <a:ln>
+            <a:noFill/>
+          </a:ln>
+        </p:spPr>
+        <p:style>
+          <a:lnRef idx="2">
+            <a:schemeClr val="accent1">
+              <a:shade val="50000"/>
+            </a:schemeClr>
+          </a:lnRef>
+          <a:fillRef idx="1">
+            <a:schemeClr val="accent1"/>
+          </a:fillRef>
+          <a:effectRef idx="0">
+            <a:schemeClr val="accent1"/>
+          </a:effectRef>
+          <a:fontRef idx="minor">
+            <a:schemeClr val="lt1"/>
+          </a:fontRef>
+        </p:style>
+        <p:txBody>
+          <a:bodyPr rtlCol="0" anchor="ctr"/>
+          <a:lstStyle/>
+          <a:p>
+            <a:pPr algn="ctr"/>
+            <a:endParaRPr lang="en-US"/>
+          </a:p>
+        </p:txBody>
+      </p:sp>
+      <p:sp>
+        <p:nvSpPr>
+          <p:cNvPr id="2" name="Título 1">
+            <a:extLst>
+              <a:ext uri="{FF2B5EF4-FFF2-40B4-BE49-F238E27FC236}">
+                <a16:creationId xmlns:a16="http://schemas.microsoft.com/office/drawing/2014/main" id="{4B31BE4B-8255-4A24-9BC3-8F857CE878E4}"/>
+              </a:ext>
+            </a:extLst>
+          </p:cNvPr>
+          <p:cNvSpPr>
+            <a:spLocks noGrp="1"/>
+          </p:cNvSpPr>
+          <p:nvPr>
+            <p:ph type="title"/>
+          </p:nvPr>
+        </p:nvSpPr>
+        <p:spPr>
+          <a:xfrm>
+            <a:off x="804672" y="1290025"/>
+            <a:ext cx="4475892" cy="1188720"/>
+          </a:xfrm>
+          <a:solidFill>
+            <a:srgbClr val="FFFFFF"/>
+          </a:solidFill>
+          <a:ln>
+            <a:solidFill>
+              <a:srgbClr val="404040"/>
+            </a:solidFill>
+          </a:ln>
+        </p:spPr>
+        <p:txBody>
+          <a:bodyPr vert="horz" lIns="182880" tIns="182880" rIns="182880" bIns="182880" rtlCol="0" anchor="ctr">
+            <a:normAutofit/>
+          </a:bodyPr>
+          <a:lstStyle/>
+          <a:p>
+            <a:r>
+              <a:rPr lang="en-US" dirty="0" err="1">
+                <a:solidFill>
+                  <a:srgbClr val="262626"/>
+                </a:solidFill>
+              </a:rPr>
+              <a:t>Livro</a:t>
+            </a:r>
+            <a:endParaRPr lang="en-US" dirty="0">
+              <a:solidFill>
+                <a:srgbClr val="262626"/>
+              </a:solidFill>
+            </a:endParaRPr>
+          </a:p>
+        </p:txBody>
+      </p:sp>
+      <p:sp>
+        <p:nvSpPr>
+          <p:cNvPr id="6" name="CaixaDeTexto 5">
+            <a:extLst>
+              <a:ext uri="{FF2B5EF4-FFF2-40B4-BE49-F238E27FC236}">
+                <a16:creationId xmlns:a16="http://schemas.microsoft.com/office/drawing/2014/main" id="{61A862E6-232F-43D3-A247-6AF1BC2D2902}"/>
+              </a:ext>
+            </a:extLst>
+          </p:cNvPr>
+          <p:cNvSpPr txBox="1"/>
+          <p:nvPr/>
+        </p:nvSpPr>
+        <p:spPr>
+          <a:xfrm>
+            <a:off x="804672" y="2858703"/>
+            <a:ext cx="4475892" cy="3042547"/>
+          </a:xfrm>
+          <a:prstGeom prst="rect">
+            <a:avLst/>
+          </a:prstGeom>
+        </p:spPr>
+        <p:txBody>
+          <a:bodyPr vert="horz" lIns="91440" tIns="45720" rIns="91440" bIns="45720" rtlCol="0">
+            <a:normAutofit/>
+          </a:bodyPr>
+          <a:lstStyle/>
+          <a:p>
+            <a:pPr indent="-228600" defTabSz="914400">
+              <a:spcBef>
+                <a:spcPts val="1000"/>
+              </a:spcBef>
+              <a:buClr>
+                <a:schemeClr val="accent2"/>
+              </a:buClr>
+              <a:buFont typeface="Arial" panose="020B0604020202020204" pitchFamily="34" charset="0"/>
+              <a:buChar char="•"/>
+            </a:pPr>
+            <a:r>
+              <a:rPr lang="en-US" dirty="0">
+                <a:solidFill>
+                  <a:srgbClr val="FFFFFF"/>
+                </a:solidFill>
+              </a:rPr>
+              <a:t>Nesta </a:t>
+            </a:r>
+            <a:r>
+              <a:rPr lang="en-US" dirty="0" err="1">
+                <a:solidFill>
+                  <a:srgbClr val="FFFFFF"/>
+                </a:solidFill>
+              </a:rPr>
+              <a:t>pagina</a:t>
+            </a:r>
+            <a:r>
+              <a:rPr lang="en-US" dirty="0">
+                <a:solidFill>
+                  <a:srgbClr val="FFFFFF"/>
+                </a:solidFill>
+              </a:rPr>
+              <a:t>, é </a:t>
+            </a:r>
+            <a:r>
+              <a:rPr lang="en-US" dirty="0" err="1">
+                <a:solidFill>
+                  <a:srgbClr val="FFFFFF"/>
+                </a:solidFill>
+              </a:rPr>
+              <a:t>possivel</a:t>
+            </a:r>
+            <a:r>
+              <a:rPr lang="en-US" dirty="0">
+                <a:solidFill>
+                  <a:srgbClr val="FFFFFF"/>
+                </a:solidFill>
+              </a:rPr>
+              <a:t> </a:t>
+            </a:r>
+            <a:r>
+              <a:rPr lang="en-US" dirty="0" err="1">
+                <a:solidFill>
+                  <a:srgbClr val="FFFFFF"/>
+                </a:solidFill>
+              </a:rPr>
+              <a:t>ver</a:t>
+            </a:r>
+            <a:r>
+              <a:rPr lang="en-US" dirty="0">
+                <a:solidFill>
+                  <a:srgbClr val="FFFFFF"/>
+                </a:solidFill>
+              </a:rPr>
+              <a:t> </a:t>
+            </a:r>
+            <a:r>
+              <a:rPr lang="en-US" dirty="0" err="1">
+                <a:solidFill>
+                  <a:srgbClr val="FFFFFF"/>
+                </a:solidFill>
+              </a:rPr>
+              <a:t>tudo</a:t>
+            </a:r>
+            <a:r>
+              <a:rPr lang="en-US" dirty="0">
+                <a:solidFill>
+                  <a:srgbClr val="FFFFFF"/>
+                </a:solidFill>
+              </a:rPr>
+              <a:t> </a:t>
+            </a:r>
+            <a:r>
+              <a:rPr lang="en-US" dirty="0" err="1">
+                <a:solidFill>
+                  <a:srgbClr val="FFFFFF"/>
+                </a:solidFill>
+              </a:rPr>
+              <a:t>sobre</a:t>
+            </a:r>
+            <a:r>
+              <a:rPr lang="en-US" dirty="0">
+                <a:solidFill>
+                  <a:srgbClr val="FFFFFF"/>
+                </a:solidFill>
+              </a:rPr>
+              <a:t> o </a:t>
+            </a:r>
+            <a:r>
+              <a:rPr lang="en-US" dirty="0" err="1">
+                <a:solidFill>
+                  <a:srgbClr val="FFFFFF"/>
+                </a:solidFill>
+              </a:rPr>
+              <a:t>livro</a:t>
+            </a:r>
+            <a:r>
+              <a:rPr lang="en-US" dirty="0">
+                <a:solidFill>
+                  <a:srgbClr val="FFFFFF"/>
+                </a:solidFill>
+              </a:rPr>
+              <a:t> </a:t>
+            </a:r>
+            <a:r>
+              <a:rPr lang="en-US" dirty="0" err="1">
+                <a:solidFill>
+                  <a:srgbClr val="FFFFFF"/>
+                </a:solidFill>
+              </a:rPr>
+              <a:t>selecionado</a:t>
+            </a:r>
+            <a:r>
+              <a:rPr lang="en-US" dirty="0">
+                <a:solidFill>
+                  <a:srgbClr val="FFFFFF"/>
+                </a:solidFill>
+              </a:rPr>
+              <a:t>, </a:t>
+            </a:r>
+            <a:r>
+              <a:rPr lang="en-US" dirty="0" err="1">
+                <a:solidFill>
+                  <a:srgbClr val="FFFFFF"/>
+                </a:solidFill>
+              </a:rPr>
+              <a:t>como</a:t>
+            </a:r>
+            <a:r>
+              <a:rPr lang="en-US" dirty="0">
+                <a:solidFill>
+                  <a:srgbClr val="FFFFFF"/>
+                </a:solidFill>
+              </a:rPr>
+              <a:t> a </a:t>
+            </a:r>
+            <a:r>
+              <a:rPr lang="en-US" dirty="0" err="1">
+                <a:solidFill>
+                  <a:srgbClr val="FFFFFF"/>
+                </a:solidFill>
+              </a:rPr>
+              <a:t>quantidade</a:t>
+            </a:r>
+            <a:r>
+              <a:rPr lang="en-US" dirty="0">
+                <a:solidFill>
+                  <a:srgbClr val="FFFFFF"/>
+                </a:solidFill>
+              </a:rPr>
+              <a:t> </a:t>
+            </a:r>
+            <a:r>
+              <a:rPr lang="en-US" dirty="0" err="1">
+                <a:solidFill>
+                  <a:srgbClr val="FFFFFF"/>
+                </a:solidFill>
+              </a:rPr>
+              <a:t>possivel</a:t>
+            </a:r>
+            <a:r>
+              <a:rPr lang="en-US" dirty="0">
+                <a:solidFill>
+                  <a:srgbClr val="FFFFFF"/>
+                </a:solidFill>
+              </a:rPr>
+              <a:t> para </a:t>
+            </a:r>
+            <a:r>
+              <a:rPr lang="en-US">
+                <a:solidFill>
+                  <a:srgbClr val="FFFFFF"/>
+                </a:solidFill>
+              </a:rPr>
+              <a:t>requisitar</a:t>
+            </a:r>
+            <a:r>
+              <a:rPr lang="en-US" dirty="0">
+                <a:solidFill>
+                  <a:srgbClr val="FFFFFF"/>
+                </a:solidFill>
+              </a:rPr>
+              <a:t>.</a:t>
+            </a:r>
+          </a:p>
+          <a:p>
+            <a:pPr indent="-228600" defTabSz="914400">
+              <a:spcBef>
+                <a:spcPts val="1000"/>
+              </a:spcBef>
+              <a:buClr>
+                <a:schemeClr val="accent2"/>
+              </a:buClr>
+              <a:buFont typeface="Arial" panose="020B0604020202020204" pitchFamily="34" charset="0"/>
+              <a:buChar char="•"/>
+            </a:pPr>
+            <a:r>
+              <a:rPr lang="en-US" dirty="0">
+                <a:solidFill>
+                  <a:srgbClr val="FFFFFF"/>
+                </a:solidFill>
+              </a:rPr>
+              <a:t>Caso ja </a:t>
+            </a:r>
+            <a:r>
+              <a:rPr lang="en-US" dirty="0" err="1">
+                <a:solidFill>
+                  <a:srgbClr val="FFFFFF"/>
+                </a:solidFill>
+              </a:rPr>
+              <a:t>tenha</a:t>
+            </a:r>
+            <a:r>
+              <a:rPr lang="en-US" dirty="0">
+                <a:solidFill>
+                  <a:srgbClr val="FFFFFF"/>
+                </a:solidFill>
+              </a:rPr>
+              <a:t> </a:t>
+            </a:r>
+            <a:r>
+              <a:rPr lang="en-US" dirty="0" err="1">
+                <a:solidFill>
+                  <a:srgbClr val="FFFFFF"/>
+                </a:solidFill>
+              </a:rPr>
+              <a:t>requizitado</a:t>
+            </a:r>
+            <a:r>
+              <a:rPr lang="en-US" dirty="0">
+                <a:solidFill>
+                  <a:srgbClr val="FFFFFF"/>
+                </a:solidFill>
+              </a:rPr>
+              <a:t> é </a:t>
+            </a:r>
+            <a:r>
+              <a:rPr lang="en-US" dirty="0" err="1">
+                <a:solidFill>
+                  <a:srgbClr val="FFFFFF"/>
+                </a:solidFill>
+              </a:rPr>
+              <a:t>possivel</a:t>
+            </a:r>
+            <a:r>
+              <a:rPr lang="en-US" dirty="0">
+                <a:solidFill>
+                  <a:srgbClr val="FFFFFF"/>
+                </a:solidFill>
+              </a:rPr>
+              <a:t> </a:t>
+            </a:r>
+            <a:r>
+              <a:rPr lang="en-US" dirty="0" err="1">
+                <a:solidFill>
+                  <a:srgbClr val="FFFFFF"/>
+                </a:solidFill>
+              </a:rPr>
+              <a:t>ver</a:t>
+            </a:r>
+            <a:r>
+              <a:rPr lang="en-US" dirty="0">
+                <a:solidFill>
+                  <a:srgbClr val="FFFFFF"/>
+                </a:solidFill>
+              </a:rPr>
+              <a:t> a data de </a:t>
+            </a:r>
+            <a:r>
+              <a:rPr lang="en-US" dirty="0" err="1">
+                <a:solidFill>
+                  <a:srgbClr val="FFFFFF"/>
+                </a:solidFill>
+              </a:rPr>
+              <a:t>entrega</a:t>
+            </a:r>
+            <a:r>
+              <a:rPr lang="en-US" dirty="0">
+                <a:solidFill>
+                  <a:srgbClr val="FFFFFF"/>
+                </a:solidFill>
+              </a:rPr>
+              <a:t>.</a:t>
+            </a:r>
+          </a:p>
+        </p:txBody>
+      </p:sp>
+      <p:sp>
+        <p:nvSpPr>
+          <p:cNvPr id="39" name="Rectangle 38">
+            <a:extLst>
+              <a:ext uri="{FF2B5EF4-FFF2-40B4-BE49-F238E27FC236}">
+                <a16:creationId xmlns:a16="http://schemas.microsoft.com/office/drawing/2014/main" id="{E87D435C-84AC-4E27-9CD3-0AAAF73EB28F}"/>
+              </a:ext>
+              <a:ext uri="{C183D7F6-B498-43B3-948B-1728B52AA6E4}">
+                <adec:decorative xmlns:adec="http://schemas.microsoft.com/office/drawing/2017/decorative" val="1"/>
+              </a:ext>
+            </a:extLst>
+          </p:cNvPr>
+          <p:cNvSpPr>
+            <a:spLocks noGrp="1" noRot="1" noChangeAspect="1" noMove="1" noResize="1" noEditPoints="1" noAdjustHandles="1" noChangeArrowheads="1" noChangeShapeType="1" noTextEdit="1"/>
+          </p:cNvSpPr>
+          <p:nvPr>
+            <p:extLst>
+              <p:ext uri="{386F3935-93C4-4BCD-93E2-E3B085C9AB24}">
+                <p16:designElem xmlns:p16="http://schemas.microsoft.com/office/powerpoint/2015/main" val="1"/>
+              </p:ext>
+            </p:extLst>
+          </p:nvPr>
+        </p:nvSpPr>
+        <p:spPr>
+          <a:xfrm>
+            <a:off x="6733032" y="640080"/>
+            <a:ext cx="4818888" cy="5261170"/>
+          </a:xfrm>
+          <a:prstGeom prst="rect">
+            <a:avLst/>
+          </a:prstGeom>
+          <a:noFill/>
+          <a:ln w="31750" cap="sq">
+            <a:solidFill>
+              <a:srgbClr val="FFFFFF"/>
+            </a:solidFill>
+            <a:miter lim="800000"/>
+          </a:ln>
+        </p:spPr>
+        <p:style>
+          <a:lnRef idx="2">
+            <a:schemeClr val="accent1">
+              <a:shade val="50000"/>
+            </a:schemeClr>
+          </a:lnRef>
+          <a:fillRef idx="1">
+            <a:schemeClr val="accent1"/>
+          </a:fillRef>
+          <a:effectRef idx="0">
+            <a:schemeClr val="accent1"/>
+          </a:effectRef>
+          <a:fontRef idx="minor">
+            <a:schemeClr val="lt1"/>
+          </a:fontRef>
+        </p:style>
+        <p:txBody>
+          <a:bodyPr rtlCol="0" anchor="ctr"/>
+          <a:lstStyle/>
+          <a:p>
+            <a:pPr algn="ctr"/>
+            <a:endParaRPr lang="en-US" dirty="0"/>
+          </a:p>
+        </p:txBody>
+      </p:sp>
+      <p:sp>
+        <p:nvSpPr>
+          <p:cNvPr id="41" name="Rectangle 40">
+            <a:extLst>
+              <a:ext uri="{FF2B5EF4-FFF2-40B4-BE49-F238E27FC236}">
+                <a16:creationId xmlns:a16="http://schemas.microsoft.com/office/drawing/2014/main" id="{EFA4C881-BF60-416C-A273-70541298EEB4}"/>
+              </a:ext>
+              <a:ext uri="{C183D7F6-B498-43B3-948B-1728B52AA6E4}">
+                <adec:decorative xmlns:adec="http://schemas.microsoft.com/office/drawing/2017/decorative" val="1"/>
+              </a:ext>
+            </a:extLst>
+          </p:cNvPr>
+          <p:cNvSpPr>
+            <a:spLocks noGrp="1" noRot="1" noChangeAspect="1" noMove="1" noResize="1" noEditPoints="1" noAdjustHandles="1" noChangeArrowheads="1" noChangeShapeType="1" noTextEdit="1"/>
+          </p:cNvSpPr>
+          <p:nvPr>
+            <p:extLst>
+              <p:ext uri="{386F3935-93C4-4BCD-93E2-E3B085C9AB24}">
+                <p16:designElem xmlns:p16="http://schemas.microsoft.com/office/powerpoint/2015/main" val="1"/>
+              </p:ext>
+            </p:extLst>
+          </p:nvPr>
+        </p:nvSpPr>
+        <p:spPr>
+          <a:xfrm>
+            <a:off x="6877586" y="806357"/>
+            <a:ext cx="4511266" cy="4928616"/>
+          </a:xfrm>
+          <a:prstGeom prst="rect">
+            <a:avLst/>
+          </a:prstGeom>
+          <a:solidFill>
+            <a:srgbClr val="FFFFFF"/>
+          </a:solidFill>
+          <a:ln>
+            <a:noFill/>
+          </a:ln>
+        </p:spPr>
+        <p:style>
+          <a:lnRef idx="2">
+            <a:schemeClr val="accent1">
+              <a:shade val="50000"/>
+            </a:schemeClr>
+          </a:lnRef>
+          <a:fillRef idx="1">
+            <a:schemeClr val="accent1"/>
+          </a:fillRef>
+          <a:effectRef idx="0">
+            <a:schemeClr val="accent1"/>
+          </a:effectRef>
+          <a:fontRef idx="minor">
+            <a:schemeClr val="lt1"/>
+          </a:fontRef>
+        </p:style>
+        <p:txBody>
+          <a:bodyPr rtlCol="0" anchor="ctr"/>
+          <a:lstStyle/>
+          <a:p>
+            <a:pPr algn="ctr"/>
+            <a:endParaRPr lang="en-US"/>
+          </a:p>
+        </p:txBody>
+      </p:sp>
+      <p:pic>
+        <p:nvPicPr>
+          <p:cNvPr id="10" name="Imagem 9">
+            <a:extLst>
+              <a:ext uri="{FF2B5EF4-FFF2-40B4-BE49-F238E27FC236}">
+                <a16:creationId xmlns:a16="http://schemas.microsoft.com/office/drawing/2014/main" id="{4B1F4B2C-64B0-47EC-B7B3-7C161AABD254}"/>
+              </a:ext>
+            </a:extLst>
+          </p:cNvPr>
+          <p:cNvPicPr>
+            <a:picLocks noChangeAspect="1"/>
+          </p:cNvPicPr>
+          <p:nvPr/>
+        </p:nvPicPr>
+        <p:blipFill>
+          <a:blip r:embed="rId2"/>
+          <a:stretch/>
         </p:blipFill>
         <p:spPr>
           <a:xfrm>
@@ -6214,7 +6848,7 @@
     </p:spTree>
     <p:extLst>
       <p:ext uri="{BB962C8B-B14F-4D97-AF65-F5344CB8AC3E}">
-        <p14:creationId xmlns:p14="http://schemas.microsoft.com/office/powerpoint/2010/main" val="2459171491"/>
+        <p14:creationId xmlns:p14="http://schemas.microsoft.com/office/powerpoint/2010/main" val="4084726636"/>
       </p:ext>
     </p:extLst>
   </p:cSld>

</xml_diff>